<commit_message>
Add Mismatch and Montecarlo simulation examples.
Add Mismatch and Montecarlo simulation examples.
</commit_message>
<xml_diff>
--- a/review/0407/noritsuna_mergePlan.pptx
+++ b/review/0407/noritsuna_mergePlan.pptx
@@ -3490,7 +3490,7 @@
 <dgm:dataModel xmlns:dgm="http://schemas.openxmlformats.org/drawingml/2006/diagram" xmlns:a="http://schemas.openxmlformats.org/drawingml/2006/main">
   <dgm:ptLst>
     <dgm:pt modelId="{86715BDF-202C-44FA-99C7-31DAC85D6E8E}" type="doc">
-      <dgm:prSet loTypeId="urn:microsoft.com/office/officeart/2005/8/layout/list1" loCatId="list" qsTypeId="urn:microsoft.com/office/officeart/2005/8/quickstyle/simple4" qsCatId="simple" csTypeId="urn:microsoft.com/office/officeart/2005/8/colors/colorful2" csCatId="colorful"/>
+      <dgm:prSet loTypeId="urn:microsoft.com/office/officeart/2005/8/layout/list1" loCatId="list" qsTypeId="urn:microsoft.com/office/officeart/2005/8/quickstyle/simple4" qsCatId="simple" csTypeId="urn:microsoft.com/office/officeart/2005/8/colors/colorful2" csCatId="colorful" phldr="1"/>
       <dgm:spPr/>
       <dgm:t>
         <a:bodyPr/>
@@ -3509,7 +3509,7 @@
         <a:p>
           <a:r>
             <a:rPr kumimoji="1" lang="ja-JP"/>
-            <a:t>目標スペック</a:t>
+            <a:t>シミュレーション時の指定ポイント</a:t>
           </a:r>
           <a:endParaRPr lang="en-US"/>
         </a:p>
@@ -3527,96 +3527,6 @@
       </dgm:t>
     </dgm:pt>
     <dgm:pt modelId="{94A4EE30-B841-47D4-8DF1-FF4AE7BB45C2}" type="sibTrans" cxnId="{770EA15E-C3AD-4759-AB76-2DB859CF7A51}">
-      <dgm:prSet/>
-      <dgm:spPr/>
-      <dgm:t>
-        <a:bodyPr/>
-        <a:lstStyle/>
-        <a:p>
-          <a:endParaRPr lang="en-US"/>
-        </a:p>
-      </dgm:t>
-    </dgm:pt>
-    <dgm:pt modelId="{06BC8162-E36D-4D55-B064-2BFB4CCF0BEA}">
-      <dgm:prSet/>
-      <dgm:spPr/>
-      <dgm:t>
-        <a:bodyPr/>
-        <a:lstStyle/>
-        <a:p>
-          <a:r>
-            <a:rPr kumimoji="1" lang="ja-JP"/>
-            <a:t>入力：</a:t>
-          </a:r>
-          <a:r>
-            <a:rPr kumimoji="1" lang="en-US"/>
-            <a:t>0V-3.3V</a:t>
-          </a:r>
-          <a:r>
-            <a:rPr kumimoji="1" lang="ja-JP"/>
-            <a:t>としていって、</a:t>
-          </a:r>
-          <a:r>
-            <a:rPr kumimoji="1" lang="en-US"/>
-            <a:t>1.25V(pfet) or 1.7V(nfet)</a:t>
-          </a:r>
-          <a:r>
-            <a:rPr kumimoji="1" lang="ja-JP"/>
-            <a:t>。</a:t>
-          </a:r>
-          <a:endParaRPr lang="en-US"/>
-        </a:p>
-      </dgm:t>
-    </dgm:pt>
-    <dgm:pt modelId="{EF141F4C-A398-401B-ADE2-625721E374C8}" type="parTrans" cxnId="{658C9301-2577-4FB9-B59E-D3E58D00DF45}">
-      <dgm:prSet/>
-      <dgm:spPr/>
-      <dgm:t>
-        <a:bodyPr/>
-        <a:lstStyle/>
-        <a:p>
-          <a:endParaRPr lang="en-US"/>
-        </a:p>
-      </dgm:t>
-    </dgm:pt>
-    <dgm:pt modelId="{26BB5AF6-11C0-4209-811A-8C4081203A73}" type="sibTrans" cxnId="{658C9301-2577-4FB9-B59E-D3E58D00DF45}">
-      <dgm:prSet/>
-      <dgm:spPr/>
-      <dgm:t>
-        <a:bodyPr/>
-        <a:lstStyle/>
-        <a:p>
-          <a:endParaRPr lang="en-US"/>
-        </a:p>
-      </dgm:t>
-    </dgm:pt>
-    <dgm:pt modelId="{C2056D0D-AF6C-4B49-BEB4-95A99535F30F}">
-      <dgm:prSet/>
-      <dgm:spPr/>
-      <dgm:t>
-        <a:bodyPr/>
-        <a:lstStyle/>
-        <a:p>
-          <a:r>
-            <a:rPr kumimoji="1" lang="ja-JP"/>
-            <a:t>シミュレーション時の指定ポイント</a:t>
-          </a:r>
-          <a:endParaRPr lang="en-US"/>
-        </a:p>
-      </dgm:t>
-    </dgm:pt>
-    <dgm:pt modelId="{E9334312-61AF-4E45-B46D-82824DE4BF93}" type="parTrans" cxnId="{E58B127A-A143-4B31-B527-8037AF942FF0}">
-      <dgm:prSet/>
-      <dgm:spPr/>
-      <dgm:t>
-        <a:bodyPr/>
-        <a:lstStyle/>
-        <a:p>
-          <a:endParaRPr lang="en-US"/>
-        </a:p>
-      </dgm:t>
-    </dgm:pt>
-    <dgm:pt modelId="{770A6879-32B5-4BEB-82E4-27C8ADAA9E3B}" type="sibTrans" cxnId="{E58B127A-A143-4B31-B527-8037AF942FF0}">
       <dgm:prSet/>
       <dgm:spPr/>
       <dgm:t>
@@ -3717,14 +3627,14 @@
         <a:lstStyle/>
         <a:p>
           <a:r>
-            <a:rPr kumimoji="1" lang="ja-JP"/>
+            <a:rPr kumimoji="1" lang="ja-JP" dirty="0"/>
             <a:t>３， </a:t>
           </a:r>
           <a:r>
-            <a:rPr kumimoji="1" lang="en-US"/>
+            <a:rPr kumimoji="1" lang="en-US" dirty="0"/>
             <a:t>125℃, ss, 3.0V</a:t>
           </a:r>
-          <a:endParaRPr lang="en-US"/>
+          <a:endParaRPr lang="en-US" dirty="0"/>
         </a:p>
       </dgm:t>
     </dgm:pt>
@@ -3750,133 +3660,6 @@
         </a:p>
       </dgm:t>
     </dgm:pt>
-    <dgm:pt modelId="{107A145E-BAB3-4BF1-8618-A13FADC55E87}">
-      <dgm:prSet/>
-      <dgm:spPr/>
-      <dgm:t>
-        <a:bodyPr/>
-        <a:lstStyle/>
-        <a:p>
-          <a:r>
-            <a:rPr kumimoji="1" lang="ja-JP"/>
-            <a:t>測定ポイント</a:t>
-          </a:r>
-          <a:endParaRPr lang="en-US"/>
-        </a:p>
-      </dgm:t>
-    </dgm:pt>
-    <dgm:pt modelId="{EDA9668A-EB77-43B2-981B-37FDE172DF19}" type="parTrans" cxnId="{A59EF690-C526-4362-9577-D7A431A811AD}">
-      <dgm:prSet/>
-      <dgm:spPr/>
-      <dgm:t>
-        <a:bodyPr/>
-        <a:lstStyle/>
-        <a:p>
-          <a:endParaRPr lang="en-US"/>
-        </a:p>
-      </dgm:t>
-    </dgm:pt>
-    <dgm:pt modelId="{22F372D0-6C24-42BD-953E-CD00FD3831D3}" type="sibTrans" cxnId="{A59EF690-C526-4362-9577-D7A431A811AD}">
-      <dgm:prSet/>
-      <dgm:spPr/>
-      <dgm:t>
-        <a:bodyPr/>
-        <a:lstStyle/>
-        <a:p>
-          <a:endParaRPr lang="en-US"/>
-        </a:p>
-      </dgm:t>
-    </dgm:pt>
-    <dgm:pt modelId="{C75A5D35-1CC3-4A2F-8BCB-2F0F220BD843}">
-      <dgm:prSet/>
-      <dgm:spPr/>
-      <dgm:t>
-        <a:bodyPr/>
-        <a:lstStyle/>
-        <a:p>
-          <a:r>
-            <a:rPr kumimoji="1" lang="en-US"/>
-            <a:t>0V</a:t>
-          </a:r>
-          <a:r>
-            <a:rPr kumimoji="1" lang="ja-JP"/>
-            <a:t>と</a:t>
-          </a:r>
-          <a:r>
-            <a:rPr kumimoji="1" lang="en-US"/>
-            <a:t>3.3V</a:t>
-          </a:r>
-          <a:r>
-            <a:rPr kumimoji="1" lang="ja-JP"/>
-            <a:t>の時の周波数</a:t>
-          </a:r>
-          <a:endParaRPr lang="en-US"/>
-        </a:p>
-      </dgm:t>
-    </dgm:pt>
-    <dgm:pt modelId="{AF4F6AAF-86EE-4B51-BCBE-3E48AF2751F8}" type="parTrans" cxnId="{8187F337-4581-49A9-A5DB-D7950788C1F1}">
-      <dgm:prSet/>
-      <dgm:spPr/>
-      <dgm:t>
-        <a:bodyPr/>
-        <a:lstStyle/>
-        <a:p>
-          <a:endParaRPr lang="en-US"/>
-        </a:p>
-      </dgm:t>
-    </dgm:pt>
-    <dgm:pt modelId="{963AC026-9185-4894-8C0B-63A751357911}" type="sibTrans" cxnId="{8187F337-4581-49A9-A5DB-D7950788C1F1}">
-      <dgm:prSet/>
-      <dgm:spPr/>
-      <dgm:t>
-        <a:bodyPr/>
-        <a:lstStyle/>
-        <a:p>
-          <a:endParaRPr lang="en-US"/>
-        </a:p>
-      </dgm:t>
-    </dgm:pt>
-    <dgm:pt modelId="{3B296117-EA91-41DF-8F26-330992978635}">
-      <dgm:prSet/>
-      <dgm:spPr/>
-      <dgm:t>
-        <a:bodyPr/>
-        <a:lstStyle/>
-        <a:p>
-          <a:r>
-            <a:rPr kumimoji="1" lang="en-US"/>
-            <a:t>3.3V</a:t>
-          </a:r>
-          <a:r>
-            <a:rPr kumimoji="1" lang="ja-JP"/>
-            <a:t>の時の周波数</a:t>
-          </a:r>
-          <a:endParaRPr lang="en-US"/>
-        </a:p>
-      </dgm:t>
-    </dgm:pt>
-    <dgm:pt modelId="{6F43345C-D493-4271-AD44-2B36F222155A}" type="parTrans" cxnId="{B2F70C3B-30BB-4AD6-8656-C8939B454A9B}">
-      <dgm:prSet/>
-      <dgm:spPr/>
-      <dgm:t>
-        <a:bodyPr/>
-        <a:lstStyle/>
-        <a:p>
-          <a:endParaRPr lang="en-US"/>
-        </a:p>
-      </dgm:t>
-    </dgm:pt>
-    <dgm:pt modelId="{5F8725A8-9883-4A77-A929-CDB4E615A5FB}" type="sibTrans" cxnId="{B2F70C3B-30BB-4AD6-8656-C8939B454A9B}">
-      <dgm:prSet/>
-      <dgm:spPr/>
-      <dgm:t>
-        <a:bodyPr/>
-        <a:lstStyle/>
-        <a:p>
-          <a:endParaRPr lang="en-US"/>
-        </a:p>
-      </dgm:t>
-    </dgm:pt>
     <dgm:pt modelId="{85DECA87-6DD0-44D2-9292-0DFDE2AE6942}" type="pres">
       <dgm:prSet presAssocID="{86715BDF-202C-44FA-99C7-31DAC85D6E8E}" presName="linear" presStyleCnt="0">
         <dgm:presLayoutVars>
@@ -3892,11 +3675,11 @@
       <dgm:spPr/>
     </dgm:pt>
     <dgm:pt modelId="{4834F6C3-8BF7-4DB6-864B-A8E16A714F8C}" type="pres">
-      <dgm:prSet presAssocID="{736A02EC-D9E7-43ED-98BC-F9C1C19EB379}" presName="parentLeftMargin" presStyleLbl="node1" presStyleIdx="0" presStyleCnt="2"/>
+      <dgm:prSet presAssocID="{736A02EC-D9E7-43ED-98BC-F9C1C19EB379}" presName="parentLeftMargin" presStyleLbl="node1" presStyleIdx="0" presStyleCnt="1"/>
       <dgm:spPr/>
     </dgm:pt>
     <dgm:pt modelId="{1F41505D-74EC-47B7-849B-AE4A25C12F8A}" type="pres">
-      <dgm:prSet presAssocID="{736A02EC-D9E7-43ED-98BC-F9C1C19EB379}" presName="parentText" presStyleLbl="node1" presStyleIdx="0" presStyleCnt="2">
+      <dgm:prSet presAssocID="{736A02EC-D9E7-43ED-98BC-F9C1C19EB379}" presName="parentText" presStyleLbl="node1" presStyleIdx="0" presStyleCnt="1">
         <dgm:presLayoutVars>
           <dgm:chMax val="0"/>
           <dgm:bulletEnabled val="1"/>
@@ -3909,40 +3692,7 @@
       <dgm:spPr/>
     </dgm:pt>
     <dgm:pt modelId="{BA5839F2-884E-4F8C-AE22-4E7DFA7DA42B}" type="pres">
-      <dgm:prSet presAssocID="{736A02EC-D9E7-43ED-98BC-F9C1C19EB379}" presName="childText" presStyleLbl="conFgAcc1" presStyleIdx="0" presStyleCnt="2">
-        <dgm:presLayoutVars>
-          <dgm:bulletEnabled val="1"/>
-        </dgm:presLayoutVars>
-      </dgm:prSet>
-      <dgm:spPr/>
-    </dgm:pt>
-    <dgm:pt modelId="{27F808FC-4625-4B22-B597-353BB02CF882}" type="pres">
-      <dgm:prSet presAssocID="{94A4EE30-B841-47D4-8DF1-FF4AE7BB45C2}" presName="spaceBetweenRectangles" presStyleCnt="0"/>
-      <dgm:spPr/>
-    </dgm:pt>
-    <dgm:pt modelId="{22365CB3-28F6-46E8-A8FF-178E473F8513}" type="pres">
-      <dgm:prSet presAssocID="{C2056D0D-AF6C-4B49-BEB4-95A99535F30F}" presName="parentLin" presStyleCnt="0"/>
-      <dgm:spPr/>
-    </dgm:pt>
-    <dgm:pt modelId="{D3054562-3E76-43DB-BB8D-A804096F731D}" type="pres">
-      <dgm:prSet presAssocID="{C2056D0D-AF6C-4B49-BEB4-95A99535F30F}" presName="parentLeftMargin" presStyleLbl="node1" presStyleIdx="0" presStyleCnt="2"/>
-      <dgm:spPr/>
-    </dgm:pt>
-    <dgm:pt modelId="{DD62A89C-1B6D-4826-A16B-EFCC5FAAE02B}" type="pres">
-      <dgm:prSet presAssocID="{C2056D0D-AF6C-4B49-BEB4-95A99535F30F}" presName="parentText" presStyleLbl="node1" presStyleIdx="1" presStyleCnt="2">
-        <dgm:presLayoutVars>
-          <dgm:chMax val="0"/>
-          <dgm:bulletEnabled val="1"/>
-        </dgm:presLayoutVars>
-      </dgm:prSet>
-      <dgm:spPr/>
-    </dgm:pt>
-    <dgm:pt modelId="{6438DF71-2591-4E1B-AC4A-F4B20C88B574}" type="pres">
-      <dgm:prSet presAssocID="{C2056D0D-AF6C-4B49-BEB4-95A99535F30F}" presName="negativeSpace" presStyleCnt="0"/>
-      <dgm:spPr/>
-    </dgm:pt>
-    <dgm:pt modelId="{B1D97E9D-7280-40FD-BA02-BEF24640FA33}" type="pres">
-      <dgm:prSet presAssocID="{C2056D0D-AF6C-4B49-BEB4-95A99535F30F}" presName="childText" presStyleLbl="conFgAcc1" presStyleIdx="1" presStyleCnt="2">
+      <dgm:prSet presAssocID="{736A02EC-D9E7-43ED-98BC-F9C1C19EB379}" presName="childText" presStyleLbl="conFgAcc1" presStyleIdx="0" presStyleCnt="1">
         <dgm:presLayoutVars>
           <dgm:bulletEnabled val="1"/>
         </dgm:presLayoutVars>
@@ -3951,38 +3701,21 @@
     </dgm:pt>
   </dgm:ptLst>
   <dgm:cxnLst>
-    <dgm:cxn modelId="{658C9301-2577-4FB9-B59E-D3E58D00DF45}" srcId="{736A02EC-D9E7-43ED-98BC-F9C1C19EB379}" destId="{06BC8162-E36D-4D55-B064-2BFB4CCF0BEA}" srcOrd="0" destOrd="0" parTransId="{EF141F4C-A398-401B-ADE2-625721E374C8}" sibTransId="{26BB5AF6-11C0-4209-811A-8C4081203A73}"/>
     <dgm:cxn modelId="{5AECA709-9AC3-4BD3-8E69-518B53712B95}" type="presOf" srcId="{736A02EC-D9E7-43ED-98BC-F9C1C19EB379}" destId="{4834F6C3-8BF7-4DB6-864B-A8E16A714F8C}" srcOrd="0" destOrd="0" presId="urn:microsoft.com/office/officeart/2005/8/layout/list1"/>
-    <dgm:cxn modelId="{E87EFC21-0CA1-432D-A9D8-C9D0F32239A8}" type="presOf" srcId="{2B944BB3-B762-46C1-A172-F55E45EE54EA}" destId="{B1D97E9D-7280-40FD-BA02-BEF24640FA33}" srcOrd="0" destOrd="2" presId="urn:microsoft.com/office/officeart/2005/8/layout/list1"/>
-    <dgm:cxn modelId="{8187F337-4581-49A9-A5DB-D7950788C1F1}" srcId="{107A145E-BAB3-4BF1-8618-A13FADC55E87}" destId="{C75A5D35-1CC3-4A2F-8BCB-2F0F220BD843}" srcOrd="0" destOrd="0" parTransId="{AF4F6AAF-86EE-4B51-BCBE-3E48AF2751F8}" sibTransId="{963AC026-9185-4894-8C0B-63A751357911}"/>
-    <dgm:cxn modelId="{D44FB338-8098-46D6-9CE4-A0A1CDF95BC2}" srcId="{C2056D0D-AF6C-4B49-BEB4-95A99535F30F}" destId="{2B944BB3-B762-46C1-A172-F55E45EE54EA}" srcOrd="2" destOrd="0" parTransId="{E6FF872C-6666-4297-8B57-6B2F9DD58E85}" sibTransId="{928463D3-3237-44ED-A00C-83ED37177E4D}"/>
-    <dgm:cxn modelId="{B2F70C3B-30BB-4AD6-8656-C8939B454A9B}" srcId="{107A145E-BAB3-4BF1-8618-A13FADC55E87}" destId="{3B296117-EA91-41DF-8F26-330992978635}" srcOrd="1" destOrd="0" parTransId="{6F43345C-D493-4271-AD44-2B36F222155A}" sibTransId="{5F8725A8-9883-4A77-A929-CDB4E615A5FB}"/>
+    <dgm:cxn modelId="{D44FB338-8098-46D6-9CE4-A0A1CDF95BC2}" srcId="{736A02EC-D9E7-43ED-98BC-F9C1C19EB379}" destId="{2B944BB3-B762-46C1-A172-F55E45EE54EA}" srcOrd="2" destOrd="0" parTransId="{E6FF872C-6666-4297-8B57-6B2F9DD58E85}" sibTransId="{928463D3-3237-44ED-A00C-83ED37177E4D}"/>
     <dgm:cxn modelId="{770EA15E-C3AD-4759-AB76-2DB859CF7A51}" srcId="{86715BDF-202C-44FA-99C7-31DAC85D6E8E}" destId="{736A02EC-D9E7-43ED-98BC-F9C1C19EB379}" srcOrd="0" destOrd="0" parTransId="{243D6890-1F3C-4460-9745-14AB48C44E96}" sibTransId="{94A4EE30-B841-47D4-8DF1-FF4AE7BB45C2}"/>
-    <dgm:cxn modelId="{FDD21241-4784-44BF-9BDF-A189C417FEDE}" srcId="{C2056D0D-AF6C-4B49-BEB4-95A99535F30F}" destId="{737C26AE-2130-406D-AA26-51B6C7515B5F}" srcOrd="1" destOrd="0" parTransId="{EE867B2A-0210-4F35-893A-7B0CF12DE8D7}" sibTransId="{2F92B654-248D-4515-9AC8-1E0CC737BE63}"/>
-    <dgm:cxn modelId="{E4536E47-8BE6-418D-BC4C-D7A13CCB1C0C}" srcId="{C2056D0D-AF6C-4B49-BEB4-95A99535F30F}" destId="{F730C14E-48D5-4341-BB39-4B39E36657C9}" srcOrd="0" destOrd="0" parTransId="{23EBFC30-2B69-4FA4-9071-6263F635E3A1}" sibTransId="{09649A61-29E9-44DF-882D-0141AD7076AF}"/>
-    <dgm:cxn modelId="{E58B127A-A143-4B31-B527-8037AF942FF0}" srcId="{86715BDF-202C-44FA-99C7-31DAC85D6E8E}" destId="{C2056D0D-AF6C-4B49-BEB4-95A99535F30F}" srcOrd="1" destOrd="0" parTransId="{E9334312-61AF-4E45-B46D-82824DE4BF93}" sibTransId="{770A6879-32B5-4BEB-82E4-27C8ADAA9E3B}"/>
-    <dgm:cxn modelId="{4639D37F-4B16-4D84-BC2D-B1ED2E7E2474}" type="presOf" srcId="{737C26AE-2130-406D-AA26-51B6C7515B5F}" destId="{B1D97E9D-7280-40FD-BA02-BEF24640FA33}" srcOrd="0" destOrd="1" presId="urn:microsoft.com/office/officeart/2005/8/layout/list1"/>
-    <dgm:cxn modelId="{D3A2578E-37EC-46C7-80E3-F603222049E5}" type="presOf" srcId="{C75A5D35-1CC3-4A2F-8BCB-2F0F220BD843}" destId="{B1D97E9D-7280-40FD-BA02-BEF24640FA33}" srcOrd="0" destOrd="4" presId="urn:microsoft.com/office/officeart/2005/8/layout/list1"/>
-    <dgm:cxn modelId="{A59EF690-C526-4362-9577-D7A431A811AD}" srcId="{C2056D0D-AF6C-4B49-BEB4-95A99535F30F}" destId="{107A145E-BAB3-4BF1-8618-A13FADC55E87}" srcOrd="3" destOrd="0" parTransId="{EDA9668A-EB77-43B2-981B-37FDE172DF19}" sibTransId="{22F372D0-6C24-42BD-953E-CD00FD3831D3}"/>
+    <dgm:cxn modelId="{FDD21241-4784-44BF-9BDF-A189C417FEDE}" srcId="{736A02EC-D9E7-43ED-98BC-F9C1C19EB379}" destId="{737C26AE-2130-406D-AA26-51B6C7515B5F}" srcOrd="1" destOrd="0" parTransId="{EE867B2A-0210-4F35-893A-7B0CF12DE8D7}" sibTransId="{2F92B654-248D-4515-9AC8-1E0CC737BE63}"/>
+    <dgm:cxn modelId="{1E63FA61-D2E1-495C-AF28-24AC41CD14A5}" type="presOf" srcId="{F730C14E-48D5-4341-BB39-4B39E36657C9}" destId="{BA5839F2-884E-4F8C-AE22-4E7DFA7DA42B}" srcOrd="0" destOrd="0" presId="urn:microsoft.com/office/officeart/2005/8/layout/list1"/>
+    <dgm:cxn modelId="{E4536E47-8BE6-418D-BC4C-D7A13CCB1C0C}" srcId="{736A02EC-D9E7-43ED-98BC-F9C1C19EB379}" destId="{F730C14E-48D5-4341-BB39-4B39E36657C9}" srcOrd="0" destOrd="0" parTransId="{23EBFC30-2B69-4FA4-9071-6263F635E3A1}" sibTransId="{09649A61-29E9-44DF-882D-0141AD7076AF}"/>
+    <dgm:cxn modelId="{56405347-48EC-4338-ADCA-AA95C78E5FF8}" type="presOf" srcId="{737C26AE-2130-406D-AA26-51B6C7515B5F}" destId="{BA5839F2-884E-4F8C-AE22-4E7DFA7DA42B}" srcOrd="0" destOrd="1" presId="urn:microsoft.com/office/officeart/2005/8/layout/list1"/>
+    <dgm:cxn modelId="{088EB052-6E23-447C-B14B-8CD0B250F73D}" type="presOf" srcId="{2B944BB3-B762-46C1-A172-F55E45EE54EA}" destId="{BA5839F2-884E-4F8C-AE22-4E7DFA7DA42B}" srcOrd="0" destOrd="2" presId="urn:microsoft.com/office/officeart/2005/8/layout/list1"/>
     <dgm:cxn modelId="{DCB92D92-ACA5-4952-AF39-60614E679196}" type="presOf" srcId="{86715BDF-202C-44FA-99C7-31DAC85D6E8E}" destId="{85DECA87-6DD0-44D2-9292-0DFDE2AE6942}" srcOrd="0" destOrd="0" presId="urn:microsoft.com/office/officeart/2005/8/layout/list1"/>
-    <dgm:cxn modelId="{74E0B7A2-ACA4-4C6C-ABE0-51686EBD0937}" type="presOf" srcId="{3B296117-EA91-41DF-8F26-330992978635}" destId="{B1D97E9D-7280-40FD-BA02-BEF24640FA33}" srcOrd="0" destOrd="5" presId="urn:microsoft.com/office/officeart/2005/8/layout/list1"/>
-    <dgm:cxn modelId="{C14188AA-43DE-4049-A316-A37D087A9708}" type="presOf" srcId="{F730C14E-48D5-4341-BB39-4B39E36657C9}" destId="{B1D97E9D-7280-40FD-BA02-BEF24640FA33}" srcOrd="0" destOrd="0" presId="urn:microsoft.com/office/officeart/2005/8/layout/list1"/>
-    <dgm:cxn modelId="{13E0F3B6-0123-445D-916E-C361852F3032}" type="presOf" srcId="{C2056D0D-AF6C-4B49-BEB4-95A99535F30F}" destId="{D3054562-3E76-43DB-BB8D-A804096F731D}" srcOrd="0" destOrd="0" presId="urn:microsoft.com/office/officeart/2005/8/layout/list1"/>
     <dgm:cxn modelId="{E8164AB7-4E34-44BE-AEB4-B30E2EAF966E}" type="presOf" srcId="{736A02EC-D9E7-43ED-98BC-F9C1C19EB379}" destId="{1F41505D-74EC-47B7-849B-AE4A25C12F8A}" srcOrd="1" destOrd="0" presId="urn:microsoft.com/office/officeart/2005/8/layout/list1"/>
-    <dgm:cxn modelId="{605C8DD8-5A40-4CA0-A34C-6FE9017E49F7}" type="presOf" srcId="{107A145E-BAB3-4BF1-8618-A13FADC55E87}" destId="{B1D97E9D-7280-40FD-BA02-BEF24640FA33}" srcOrd="0" destOrd="3" presId="urn:microsoft.com/office/officeart/2005/8/layout/list1"/>
-    <dgm:cxn modelId="{F46CFEF0-BD27-4524-9BE2-1E5CC9B6CA14}" type="presOf" srcId="{06BC8162-E36D-4D55-B064-2BFB4CCF0BEA}" destId="{BA5839F2-884E-4F8C-AE22-4E7DFA7DA42B}" srcOrd="0" destOrd="0" presId="urn:microsoft.com/office/officeart/2005/8/layout/list1"/>
-    <dgm:cxn modelId="{8AFC7BF9-8E05-4B38-92A0-14449CD6F812}" type="presOf" srcId="{C2056D0D-AF6C-4B49-BEB4-95A99535F30F}" destId="{DD62A89C-1B6D-4826-A16B-EFCC5FAAE02B}" srcOrd="1" destOrd="0" presId="urn:microsoft.com/office/officeart/2005/8/layout/list1"/>
     <dgm:cxn modelId="{03AD3837-3F89-4688-B01B-07A0ADA4E61E}" type="presParOf" srcId="{85DECA87-6DD0-44D2-9292-0DFDE2AE6942}" destId="{977AC821-E9C7-48BE-B3BD-E4F439D317D5}" srcOrd="0" destOrd="0" presId="urn:microsoft.com/office/officeart/2005/8/layout/list1"/>
     <dgm:cxn modelId="{9C45CABE-B907-415A-BB53-78539C930E9D}" type="presParOf" srcId="{977AC821-E9C7-48BE-B3BD-E4F439D317D5}" destId="{4834F6C3-8BF7-4DB6-864B-A8E16A714F8C}" srcOrd="0" destOrd="0" presId="urn:microsoft.com/office/officeart/2005/8/layout/list1"/>
     <dgm:cxn modelId="{236000FA-8372-4E99-8194-282D2B94EE79}" type="presParOf" srcId="{977AC821-E9C7-48BE-B3BD-E4F439D317D5}" destId="{1F41505D-74EC-47B7-849B-AE4A25C12F8A}" srcOrd="1" destOrd="0" presId="urn:microsoft.com/office/officeart/2005/8/layout/list1"/>
     <dgm:cxn modelId="{1FACDA61-2ACC-4865-A9DD-4B93524988AB}" type="presParOf" srcId="{85DECA87-6DD0-44D2-9292-0DFDE2AE6942}" destId="{AD7C7C36-B081-4EAD-8A86-8BF3719B59AF}" srcOrd="1" destOrd="0" presId="urn:microsoft.com/office/officeart/2005/8/layout/list1"/>
     <dgm:cxn modelId="{FE66F822-4D2F-4B27-B5AF-1DC65D733191}" type="presParOf" srcId="{85DECA87-6DD0-44D2-9292-0DFDE2AE6942}" destId="{BA5839F2-884E-4F8C-AE22-4E7DFA7DA42B}" srcOrd="2" destOrd="0" presId="urn:microsoft.com/office/officeart/2005/8/layout/list1"/>
-    <dgm:cxn modelId="{052C554F-F74D-4440-B7A2-96D0C00A7D62}" type="presParOf" srcId="{85DECA87-6DD0-44D2-9292-0DFDE2AE6942}" destId="{27F808FC-4625-4B22-B597-353BB02CF882}" srcOrd="3" destOrd="0" presId="urn:microsoft.com/office/officeart/2005/8/layout/list1"/>
-    <dgm:cxn modelId="{AC599B14-DE49-4C1F-A406-D13B3980570B}" type="presParOf" srcId="{85DECA87-6DD0-44D2-9292-0DFDE2AE6942}" destId="{22365CB3-28F6-46E8-A8FF-178E473F8513}" srcOrd="4" destOrd="0" presId="urn:microsoft.com/office/officeart/2005/8/layout/list1"/>
-    <dgm:cxn modelId="{5369B943-8DA2-48E1-AC8A-68A5880270B2}" type="presParOf" srcId="{22365CB3-28F6-46E8-A8FF-178E473F8513}" destId="{D3054562-3E76-43DB-BB8D-A804096F731D}" srcOrd="0" destOrd="0" presId="urn:microsoft.com/office/officeart/2005/8/layout/list1"/>
-    <dgm:cxn modelId="{7A87C471-2284-48FA-967B-252FEF4370C8}" type="presParOf" srcId="{22365CB3-28F6-46E8-A8FF-178E473F8513}" destId="{DD62A89C-1B6D-4826-A16B-EFCC5FAAE02B}" srcOrd="1" destOrd="0" presId="urn:microsoft.com/office/officeart/2005/8/layout/list1"/>
-    <dgm:cxn modelId="{02AD84E6-79FD-4B32-B35D-75769DEBEC2C}" type="presParOf" srcId="{85DECA87-6DD0-44D2-9292-0DFDE2AE6942}" destId="{6438DF71-2591-4E1B-AC4A-F4B20C88B574}" srcOrd="5" destOrd="0" presId="urn:microsoft.com/office/officeart/2005/8/layout/list1"/>
-    <dgm:cxn modelId="{1253EF57-B5BB-4130-8D7C-ABF66DBAB985}" type="presParOf" srcId="{85DECA87-6DD0-44D2-9292-0DFDE2AE6942}" destId="{B1D97E9D-7280-40FD-BA02-BEF24640FA33}" srcOrd="6" destOrd="0" presId="urn:microsoft.com/office/officeart/2005/8/layout/list1"/>
   </dgm:cxnLst>
   <dgm:bg/>
   <dgm:whole/>
@@ -4355,8 +4088,8 @@
       </dsp:nvSpPr>
       <dsp:spPr>
         <a:xfrm>
-          <a:off x="0" y="389209"/>
-          <a:ext cx="6666833" cy="1354500"/>
+          <a:off x="0" y="1945309"/>
+          <a:ext cx="6666833" cy="1858500"/>
         </a:xfrm>
         <a:prstGeom prst="rect">
           <a:avLst/>
@@ -4376,200 +4109,6 @@
               <a:hueOff val="0"/>
               <a:satOff val="0"/>
               <a:lumOff val="0"/>
-              <a:alphaOff val="0"/>
-            </a:schemeClr>
-          </a:solidFill>
-          <a:prstDash val="solid"/>
-          <a:miter lim="800000"/>
-        </a:ln>
-        <a:effectLst/>
-      </dsp:spPr>
-      <dsp:style>
-        <a:lnRef idx="1">
-          <a:scrgbClr r="0" g="0" b="0"/>
-        </a:lnRef>
-        <a:fillRef idx="1">
-          <a:scrgbClr r="0" g="0" b="0"/>
-        </a:fillRef>
-        <a:effectRef idx="0">
-          <a:scrgbClr r="0" g="0" b="0"/>
-        </a:effectRef>
-        <a:fontRef idx="minor"/>
-      </dsp:style>
-      <dsp:txBody>
-        <a:bodyPr spcFirstLastPara="0" vert="horz" wrap="square" lIns="517420" tIns="416560" rIns="517420" bIns="142240" numCol="1" spcCol="1270" anchor="t" anchorCtr="0">
-          <a:noAutofit/>
-        </a:bodyPr>
-        <a:lstStyle/>
-        <a:p>
-          <a:pPr marL="228600" lvl="1" indent="-228600" algn="l" defTabSz="889000">
-            <a:lnSpc>
-              <a:spcPct val="90000"/>
-            </a:lnSpc>
-            <a:spcBef>
-              <a:spcPct val="0"/>
-            </a:spcBef>
-            <a:spcAft>
-              <a:spcPct val="15000"/>
-            </a:spcAft>
-            <a:buChar char="•"/>
-          </a:pPr>
-          <a:r>
-            <a:rPr kumimoji="1" lang="ja-JP" sz="2000" kern="1200"/>
-            <a:t>入力：</a:t>
-          </a:r>
-          <a:r>
-            <a:rPr kumimoji="1" lang="en-US" sz="2000" kern="1200"/>
-            <a:t>0V-3.3V</a:t>
-          </a:r>
-          <a:r>
-            <a:rPr kumimoji="1" lang="ja-JP" sz="2000" kern="1200"/>
-            <a:t>としていって、</a:t>
-          </a:r>
-          <a:r>
-            <a:rPr kumimoji="1" lang="en-US" sz="2000" kern="1200"/>
-            <a:t>1.25V(pfet) or 1.7V(nfet)</a:t>
-          </a:r>
-          <a:r>
-            <a:rPr kumimoji="1" lang="ja-JP" sz="2000" kern="1200"/>
-            <a:t>。</a:t>
-          </a:r>
-          <a:endParaRPr lang="en-US" sz="2000" kern="1200"/>
-        </a:p>
-      </dsp:txBody>
-      <dsp:txXfrm>
-        <a:off x="0" y="389209"/>
-        <a:ext cx="6666833" cy="1354500"/>
-      </dsp:txXfrm>
-    </dsp:sp>
-    <dsp:sp modelId="{1F41505D-74EC-47B7-849B-AE4A25C12F8A}">
-      <dsp:nvSpPr>
-        <dsp:cNvPr id="0" name=""/>
-        <dsp:cNvSpPr/>
-      </dsp:nvSpPr>
-      <dsp:spPr>
-        <a:xfrm>
-          <a:off x="333341" y="94009"/>
-          <a:ext cx="4666783" cy="590400"/>
-        </a:xfrm>
-        <a:prstGeom prst="roundRect">
-          <a:avLst/>
-        </a:prstGeom>
-        <a:gradFill rotWithShape="0">
-          <a:gsLst>
-            <a:gs pos="0">
-              <a:schemeClr val="accent2">
-                <a:hueOff val="0"/>
-                <a:satOff val="0"/>
-                <a:lumOff val="0"/>
-                <a:alphaOff val="0"/>
-                <a:satMod val="103000"/>
-                <a:lumMod val="102000"/>
-                <a:tint val="94000"/>
-              </a:schemeClr>
-            </a:gs>
-            <a:gs pos="50000">
-              <a:schemeClr val="accent2">
-                <a:hueOff val="0"/>
-                <a:satOff val="0"/>
-                <a:lumOff val="0"/>
-                <a:alphaOff val="0"/>
-                <a:satMod val="110000"/>
-                <a:lumMod val="100000"/>
-                <a:shade val="100000"/>
-              </a:schemeClr>
-            </a:gs>
-            <a:gs pos="100000">
-              <a:schemeClr val="accent2">
-                <a:hueOff val="0"/>
-                <a:satOff val="0"/>
-                <a:lumOff val="0"/>
-                <a:alphaOff val="0"/>
-                <a:lumMod val="99000"/>
-                <a:satMod val="120000"/>
-                <a:shade val="78000"/>
-              </a:schemeClr>
-            </a:gs>
-          </a:gsLst>
-          <a:lin ang="5400000" scaled="0"/>
-        </a:gradFill>
-        <a:ln>
-          <a:noFill/>
-        </a:ln>
-        <a:effectLst/>
-      </dsp:spPr>
-      <dsp:style>
-        <a:lnRef idx="0">
-          <a:scrgbClr r="0" g="0" b="0"/>
-        </a:lnRef>
-        <a:fillRef idx="3">
-          <a:scrgbClr r="0" g="0" b="0"/>
-        </a:fillRef>
-        <a:effectRef idx="2">
-          <a:scrgbClr r="0" g="0" b="0"/>
-        </a:effectRef>
-        <a:fontRef idx="minor">
-          <a:schemeClr val="lt1"/>
-        </a:fontRef>
-      </dsp:style>
-      <dsp:txBody>
-        <a:bodyPr spcFirstLastPara="0" vert="horz" wrap="square" lIns="176393" tIns="0" rIns="176393" bIns="0" numCol="1" spcCol="1270" anchor="ctr" anchorCtr="0">
-          <a:noAutofit/>
-        </a:bodyPr>
-        <a:lstStyle/>
-        <a:p>
-          <a:pPr marL="0" lvl="0" indent="0" algn="l" defTabSz="889000">
-            <a:lnSpc>
-              <a:spcPct val="90000"/>
-            </a:lnSpc>
-            <a:spcBef>
-              <a:spcPct val="0"/>
-            </a:spcBef>
-            <a:spcAft>
-              <a:spcPct val="35000"/>
-            </a:spcAft>
-            <a:buNone/>
-          </a:pPr>
-          <a:r>
-            <a:rPr kumimoji="1" lang="ja-JP" sz="2000" kern="1200"/>
-            <a:t>目標スペック</a:t>
-          </a:r>
-          <a:endParaRPr lang="en-US" sz="2000" kern="1200"/>
-        </a:p>
-      </dsp:txBody>
-      <dsp:txXfrm>
-        <a:off x="362162" y="122830"/>
-        <a:ext cx="4609141" cy="532758"/>
-      </dsp:txXfrm>
-    </dsp:sp>
-    <dsp:sp modelId="{B1D97E9D-7280-40FD-BA02-BEF24640FA33}">
-      <dsp:nvSpPr>
-        <dsp:cNvPr id="0" name=""/>
-        <dsp:cNvSpPr/>
-      </dsp:nvSpPr>
-      <dsp:spPr>
-        <a:xfrm>
-          <a:off x="0" y="2146909"/>
-          <a:ext cx="6666833" cy="3213000"/>
-        </a:xfrm>
-        <a:prstGeom prst="rect">
-          <a:avLst/>
-        </a:prstGeom>
-        <a:solidFill>
-          <a:schemeClr val="lt1">
-            <a:alpha val="90000"/>
-            <a:hueOff val="0"/>
-            <a:satOff val="0"/>
-            <a:lumOff val="0"/>
-            <a:alphaOff val="0"/>
-          </a:schemeClr>
-        </a:solidFill>
-        <a:ln w="12700" cap="flat" cmpd="sng" algn="ctr">
-          <a:solidFill>
-            <a:schemeClr val="accent2">
-              <a:hueOff val="6443614"/>
-              <a:satOff val="-18493"/>
-              <a:lumOff val="-29609"/>
               <a:alphaOff val="0"/>
             </a:schemeClr>
           </a:solidFill>
@@ -4655,102 +4194,29 @@
             <a:buChar char="•"/>
           </a:pPr>
           <a:r>
-            <a:rPr kumimoji="1" lang="ja-JP" sz="2000" kern="1200"/>
+            <a:rPr kumimoji="1" lang="ja-JP" sz="2000" kern="1200" dirty="0"/>
             <a:t>３， </a:t>
           </a:r>
           <a:r>
-            <a:rPr kumimoji="1" lang="en-US" sz="2000" kern="1200"/>
+            <a:rPr kumimoji="1" lang="en-US" sz="2000" kern="1200" dirty="0"/>
             <a:t>125℃, ss, 3.0V</a:t>
           </a:r>
-          <a:endParaRPr lang="en-US" sz="2000" kern="1200"/>
-        </a:p>
-        <a:p>
-          <a:pPr marL="228600" lvl="1" indent="-228600" algn="l" defTabSz="889000">
-            <a:lnSpc>
-              <a:spcPct val="90000"/>
-            </a:lnSpc>
-            <a:spcBef>
-              <a:spcPct val="0"/>
-            </a:spcBef>
-            <a:spcAft>
-              <a:spcPct val="15000"/>
-            </a:spcAft>
-            <a:buChar char="•"/>
-          </a:pPr>
-          <a:r>
-            <a:rPr kumimoji="1" lang="ja-JP" sz="2000" kern="1200"/>
-            <a:t>測定ポイント</a:t>
-          </a:r>
-          <a:endParaRPr lang="en-US" sz="2000" kern="1200"/>
-        </a:p>
-        <a:p>
-          <a:pPr marL="457200" lvl="2" indent="-228600" algn="l" defTabSz="889000">
-            <a:lnSpc>
-              <a:spcPct val="90000"/>
-            </a:lnSpc>
-            <a:spcBef>
-              <a:spcPct val="0"/>
-            </a:spcBef>
-            <a:spcAft>
-              <a:spcPct val="15000"/>
-            </a:spcAft>
-            <a:buChar char="•"/>
-          </a:pPr>
-          <a:r>
-            <a:rPr kumimoji="1" lang="en-US" sz="2000" kern="1200"/>
-            <a:t>0V</a:t>
-          </a:r>
-          <a:r>
-            <a:rPr kumimoji="1" lang="ja-JP" sz="2000" kern="1200"/>
-            <a:t>と</a:t>
-          </a:r>
-          <a:r>
-            <a:rPr kumimoji="1" lang="en-US" sz="2000" kern="1200"/>
-            <a:t>3.3V</a:t>
-          </a:r>
-          <a:r>
-            <a:rPr kumimoji="1" lang="ja-JP" sz="2000" kern="1200"/>
-            <a:t>の時の周波数</a:t>
-          </a:r>
-          <a:endParaRPr lang="en-US" sz="2000" kern="1200"/>
-        </a:p>
-        <a:p>
-          <a:pPr marL="457200" lvl="2" indent="-228600" algn="l" defTabSz="889000">
-            <a:lnSpc>
-              <a:spcPct val="90000"/>
-            </a:lnSpc>
-            <a:spcBef>
-              <a:spcPct val="0"/>
-            </a:spcBef>
-            <a:spcAft>
-              <a:spcPct val="15000"/>
-            </a:spcAft>
-            <a:buChar char="•"/>
-          </a:pPr>
-          <a:r>
-            <a:rPr kumimoji="1" lang="en-US" sz="2000" kern="1200"/>
-            <a:t>3.3V</a:t>
-          </a:r>
-          <a:r>
-            <a:rPr kumimoji="1" lang="ja-JP" sz="2000" kern="1200"/>
-            <a:t>の時の周波数</a:t>
-          </a:r>
-          <a:endParaRPr lang="en-US" sz="2000" kern="1200"/>
+          <a:endParaRPr lang="en-US" sz="2000" kern="1200" dirty="0"/>
         </a:p>
       </dsp:txBody>
       <dsp:txXfrm>
-        <a:off x="0" y="2146909"/>
-        <a:ext cx="6666833" cy="3213000"/>
+        <a:off x="0" y="1945309"/>
+        <a:ext cx="6666833" cy="1858500"/>
       </dsp:txXfrm>
     </dsp:sp>
-    <dsp:sp modelId="{DD62A89C-1B6D-4826-A16B-EFCC5FAAE02B}">
+    <dsp:sp modelId="{1F41505D-74EC-47B7-849B-AE4A25C12F8A}">
       <dsp:nvSpPr>
         <dsp:cNvPr id="0" name=""/>
         <dsp:cNvSpPr/>
       </dsp:nvSpPr>
       <dsp:spPr>
         <a:xfrm>
-          <a:off x="333341" y="1851709"/>
+          <a:off x="333341" y="1650109"/>
           <a:ext cx="4666783" cy="590400"/>
         </a:xfrm>
         <a:prstGeom prst="roundRect">
@@ -4760,9 +4226,9 @@
           <a:gsLst>
             <a:gs pos="0">
               <a:schemeClr val="accent2">
-                <a:hueOff val="6443614"/>
-                <a:satOff val="-18493"/>
-                <a:lumOff val="-29609"/>
+                <a:hueOff val="0"/>
+                <a:satOff val="0"/>
+                <a:lumOff val="0"/>
                 <a:alphaOff val="0"/>
                 <a:satMod val="103000"/>
                 <a:lumMod val="102000"/>
@@ -4771,9 +4237,9 @@
             </a:gs>
             <a:gs pos="50000">
               <a:schemeClr val="accent2">
-                <a:hueOff val="6443614"/>
-                <a:satOff val="-18493"/>
-                <a:lumOff val="-29609"/>
+                <a:hueOff val="0"/>
+                <a:satOff val="0"/>
+                <a:lumOff val="0"/>
                 <a:alphaOff val="0"/>
                 <a:satMod val="110000"/>
                 <a:lumMod val="100000"/>
@@ -4782,9 +4248,9 @@
             </a:gs>
             <a:gs pos="100000">
               <a:schemeClr val="accent2">
-                <a:hueOff val="6443614"/>
-                <a:satOff val="-18493"/>
-                <a:lumOff val="-29609"/>
+                <a:hueOff val="0"/>
+                <a:satOff val="0"/>
+                <a:lumOff val="0"/>
                 <a:alphaOff val="0"/>
                 <a:lumMod val="99000"/>
                 <a:satMod val="120000"/>
@@ -4839,7 +4305,7 @@
         </a:p>
       </dsp:txBody>
       <dsp:txXfrm>
-        <a:off x="362162" y="1880530"/>
+        <a:off x="362162" y="1678930"/>
         <a:ext cx="4609141" cy="532758"/>
       </dsp:txXfrm>
     </dsp:sp>
@@ -7389,7 +6855,7 @@
           <a:p>
             <a:fld id="{B4876E8F-672F-412A-AE2E-7FCD717ADA2E}" type="datetimeFigureOut">
               <a:rPr kumimoji="1" lang="ja-JP" altLang="en-US" smtClean="0"/>
-              <a:t>2024/4/6</a:t>
+              <a:t>2024/4/8</a:t>
             </a:fld>
             <a:endParaRPr kumimoji="1" lang="ja-JP" altLang="en-US"/>
           </a:p>
@@ -7919,7 +7385,7 @@
           <a:p>
             <a:fld id="{92A5F430-7FB3-4A74-8514-AC7DDC05BAD5}" type="datetimeFigureOut">
               <a:rPr kumimoji="1" lang="ja-JP" altLang="en-US" smtClean="0"/>
-              <a:t>2024/4/6</a:t>
+              <a:t>2024/4/8</a:t>
             </a:fld>
             <a:endParaRPr kumimoji="1" lang="ja-JP" altLang="en-US"/>
           </a:p>
@@ -8149,7 +7615,7 @@
           <a:p>
             <a:fld id="{92A5F430-7FB3-4A74-8514-AC7DDC05BAD5}" type="datetimeFigureOut">
               <a:rPr kumimoji="1" lang="ja-JP" altLang="en-US" smtClean="0"/>
-              <a:t>2024/4/6</a:t>
+              <a:t>2024/4/8</a:t>
             </a:fld>
             <a:endParaRPr kumimoji="1" lang="ja-JP" altLang="en-US"/>
           </a:p>
@@ -8389,7 +7855,7 @@
           <a:p>
             <a:fld id="{92A5F430-7FB3-4A74-8514-AC7DDC05BAD5}" type="datetimeFigureOut">
               <a:rPr kumimoji="1" lang="ja-JP" altLang="en-US" smtClean="0"/>
-              <a:t>2024/4/6</a:t>
+              <a:t>2024/4/8</a:t>
             </a:fld>
             <a:endParaRPr kumimoji="1" lang="ja-JP" altLang="en-US"/>
           </a:p>
@@ -8619,7 +8085,7 @@
           <a:p>
             <a:fld id="{92A5F430-7FB3-4A74-8514-AC7DDC05BAD5}" type="datetimeFigureOut">
               <a:rPr kumimoji="1" lang="ja-JP" altLang="en-US" smtClean="0"/>
-              <a:t>2024/4/6</a:t>
+              <a:t>2024/4/8</a:t>
             </a:fld>
             <a:endParaRPr kumimoji="1" lang="ja-JP" altLang="en-US"/>
           </a:p>
@@ -8894,7 +8360,7 @@
           <a:p>
             <a:fld id="{92A5F430-7FB3-4A74-8514-AC7DDC05BAD5}" type="datetimeFigureOut">
               <a:rPr kumimoji="1" lang="ja-JP" altLang="en-US" smtClean="0"/>
-              <a:t>2024/4/6</a:t>
+              <a:t>2024/4/8</a:t>
             </a:fld>
             <a:endParaRPr kumimoji="1" lang="ja-JP" altLang="en-US"/>
           </a:p>
@@ -9223,7 +8689,7 @@
           <a:p>
             <a:fld id="{92A5F430-7FB3-4A74-8514-AC7DDC05BAD5}" type="datetimeFigureOut">
               <a:rPr kumimoji="1" lang="ja-JP" altLang="en-US" smtClean="0"/>
-              <a:t>2024/4/6</a:t>
+              <a:t>2024/4/8</a:t>
             </a:fld>
             <a:endParaRPr kumimoji="1" lang="ja-JP" altLang="en-US"/>
           </a:p>
@@ -9699,7 +9165,7 @@
           <a:p>
             <a:fld id="{92A5F430-7FB3-4A74-8514-AC7DDC05BAD5}" type="datetimeFigureOut">
               <a:rPr kumimoji="1" lang="ja-JP" altLang="en-US" smtClean="0"/>
-              <a:t>2024/4/6</a:t>
+              <a:t>2024/4/8</a:t>
             </a:fld>
             <a:endParaRPr kumimoji="1" lang="ja-JP" altLang="en-US"/>
           </a:p>
@@ -9840,7 +9306,7 @@
           <a:p>
             <a:fld id="{92A5F430-7FB3-4A74-8514-AC7DDC05BAD5}" type="datetimeFigureOut">
               <a:rPr kumimoji="1" lang="ja-JP" altLang="en-US" smtClean="0"/>
-              <a:t>2024/4/6</a:t>
+              <a:t>2024/4/8</a:t>
             </a:fld>
             <a:endParaRPr kumimoji="1" lang="ja-JP" altLang="en-US"/>
           </a:p>
@@ -9953,7 +9419,7 @@
           <a:p>
             <a:fld id="{92A5F430-7FB3-4A74-8514-AC7DDC05BAD5}" type="datetimeFigureOut">
               <a:rPr kumimoji="1" lang="ja-JP" altLang="en-US" smtClean="0"/>
-              <a:t>2024/4/6</a:t>
+              <a:t>2024/4/8</a:t>
             </a:fld>
             <a:endParaRPr kumimoji="1" lang="ja-JP" altLang="en-US"/>
           </a:p>
@@ -10296,7 +9762,7 @@
           <a:p>
             <a:fld id="{92A5F430-7FB3-4A74-8514-AC7DDC05BAD5}" type="datetimeFigureOut">
               <a:rPr kumimoji="1" lang="ja-JP" altLang="en-US" smtClean="0"/>
-              <a:t>2024/4/6</a:t>
+              <a:t>2024/4/8</a:t>
             </a:fld>
             <a:endParaRPr kumimoji="1" lang="ja-JP" altLang="en-US"/>
           </a:p>
@@ -10584,7 +10050,7 @@
           <a:p>
             <a:fld id="{92A5F430-7FB3-4A74-8514-AC7DDC05BAD5}" type="datetimeFigureOut">
               <a:rPr kumimoji="1" lang="ja-JP" altLang="en-US" smtClean="0"/>
-              <a:t>2024/4/6</a:t>
+              <a:t>2024/4/8</a:t>
             </a:fld>
             <a:endParaRPr kumimoji="1" lang="ja-JP" altLang="en-US"/>
           </a:p>
@@ -10857,7 +10323,7 @@
           <a:p>
             <a:fld id="{92A5F430-7FB3-4A74-8514-AC7DDC05BAD5}" type="datetimeFigureOut">
               <a:rPr kumimoji="1" lang="ja-JP" altLang="en-US" smtClean="0"/>
-              <a:t>2024/4/6</a:t>
+              <a:t>2024/4/8</a:t>
             </a:fld>
             <a:endParaRPr kumimoji="1" lang="ja-JP" altLang="en-US"/>
           </a:p>
@@ -13300,7 +12766,7 @@
             <p:ph idx="1"/>
             <p:extLst>
               <p:ext uri="{D42A27DB-BD31-4B8C-83A1-F6EECF244321}">
-                <p14:modId xmlns:p14="http://schemas.microsoft.com/office/powerpoint/2010/main" val="2588090408"/>
+                <p14:modId xmlns:p14="http://schemas.microsoft.com/office/powerpoint/2010/main" val="3228140765"/>
               </p:ext>
             </p:extLst>
           </p:nvPr>

</xml_diff>